<commit_message>
Doc : updated poster with objectives
</commit_message>
<xml_diff>
--- a/doc/poster.pptx
+++ b/doc/poster.pptx
@@ -273,7 +273,7 @@
               <a:pPr>
                 <a:defRPr/>
               </a:pPr>
-              <a:t>30.08.16</a:t>
+              <a:t>31.08.16</a:t>
             </a:fld>
             <a:endParaRPr lang="it-IT"/>
           </a:p>
@@ -497,7 +497,7 @@
               <a:pPr>
                 <a:defRPr/>
               </a:pPr>
-              <a:t>30.08.16</a:t>
+              <a:t>31.08.16</a:t>
             </a:fld>
             <a:endParaRPr lang="it-IT"/>
           </a:p>
@@ -1073,14 +1073,14 @@
           </a:ln>
           <a:extLst>
             <a:ext uri="{909E8E84-426E-40dd-AFC4-6F175D3DCCD1}">
-              <a14:hiddenFill xmlns:a14="http://schemas.microsoft.com/office/drawing/2010/main" xmlns="">
+              <a14:hiddenFill xmlns="" xmlns:a14="http://schemas.microsoft.com/office/drawing/2010/main">
                 <a:solidFill>
                   <a:srgbClr val="FFFFFF"/>
                 </a:solidFill>
               </a14:hiddenFill>
             </a:ext>
             <a:ext uri="{91240B29-F687-4f45-9708-019B960494DF}">
-              <a14:hiddenLine xmlns:a14="http://schemas.microsoft.com/office/drawing/2010/main" xmlns="" w="9525">
+              <a14:hiddenLine xmlns="" xmlns:a14="http://schemas.microsoft.com/office/drawing/2010/main" w="9525">
                 <a:solidFill>
                   <a:srgbClr val="000000"/>
                 </a:solidFill>
@@ -1762,14 +1762,14 @@
           </a:ln>
           <a:extLst>
             <a:ext uri="{909E8E84-426E-40dd-AFC4-6F175D3DCCD1}">
-              <a14:hiddenFill xmlns:a14="http://schemas.microsoft.com/office/drawing/2010/main" xmlns="">
+              <a14:hiddenFill xmlns="" xmlns:a14="http://schemas.microsoft.com/office/drawing/2010/main">
                 <a:solidFill>
                   <a:srgbClr val="FFFFFF"/>
                 </a:solidFill>
               </a14:hiddenFill>
             </a:ext>
             <a:ext uri="{91240B29-F687-4f45-9708-019B960494DF}">
-              <a14:hiddenLine xmlns:a14="http://schemas.microsoft.com/office/drawing/2010/main" xmlns="" w="9525">
+              <a14:hiddenLine xmlns="" xmlns:a14="http://schemas.microsoft.com/office/drawing/2010/main" w="9525">
                 <a:solidFill>
                   <a:srgbClr val="000000"/>
                 </a:solidFill>
@@ -1923,14 +1923,14 @@
           </a:ln>
           <a:extLst>
             <a:ext uri="{909E8E84-426E-40dd-AFC4-6F175D3DCCD1}">
-              <a14:hiddenFill xmlns:a14="http://schemas.microsoft.com/office/drawing/2010/main" xmlns="">
+              <a14:hiddenFill xmlns="" xmlns:a14="http://schemas.microsoft.com/office/drawing/2010/main">
                 <a:solidFill>
                   <a:srgbClr val="FFFFFF"/>
                 </a:solidFill>
               </a14:hiddenFill>
             </a:ext>
             <a:ext uri="{91240B29-F687-4f45-9708-019B960494DF}">
-              <a14:hiddenLine xmlns:a14="http://schemas.microsoft.com/office/drawing/2010/main" xmlns="" w="9525">
+              <a14:hiddenLine xmlns="" xmlns:a14="http://schemas.microsoft.com/office/drawing/2010/main" w="9525">
                 <a:solidFill>
                   <a:srgbClr val="000000"/>
                 </a:solidFill>
@@ -2012,14 +2012,14 @@
           </a:ln>
           <a:extLst>
             <a:ext uri="{909E8E84-426E-40dd-AFC4-6F175D3DCCD1}">
-              <a14:hiddenFill xmlns:a14="http://schemas.microsoft.com/office/drawing/2010/main" xmlns="">
+              <a14:hiddenFill xmlns="" xmlns:a14="http://schemas.microsoft.com/office/drawing/2010/main">
                 <a:solidFill>
                   <a:srgbClr val="FFFFFF"/>
                 </a:solidFill>
               </a14:hiddenFill>
             </a:ext>
             <a:ext uri="{91240B29-F687-4f45-9708-019B960494DF}">
-              <a14:hiddenLine xmlns:a14="http://schemas.microsoft.com/office/drawing/2010/main" xmlns="" w="9525">
+              <a14:hiddenLine xmlns="" xmlns:a14="http://schemas.microsoft.com/office/drawing/2010/main" w="9525">
                 <a:solidFill>
                   <a:srgbClr val="000000"/>
                 </a:solidFill>
@@ -2149,14 +2149,14 @@
           </a:ln>
           <a:extLst>
             <a:ext uri="{909E8E84-426E-40dd-AFC4-6F175D3DCCD1}">
-              <a14:hiddenFill xmlns:a14="http://schemas.microsoft.com/office/drawing/2010/main" xmlns="">
+              <a14:hiddenFill xmlns="" xmlns:a14="http://schemas.microsoft.com/office/drawing/2010/main">
                 <a:solidFill>
                   <a:srgbClr val="FFFFFF"/>
                 </a:solidFill>
               </a14:hiddenFill>
             </a:ext>
             <a:ext uri="{91240B29-F687-4f45-9708-019B960494DF}">
-              <a14:hiddenLine xmlns:a14="http://schemas.microsoft.com/office/drawing/2010/main" xmlns="" w="9525">
+              <a14:hiddenLine xmlns="" xmlns:a14="http://schemas.microsoft.com/office/drawing/2010/main" w="9525">
                 <a:solidFill>
                   <a:srgbClr val="000000"/>
                 </a:solidFill>
@@ -2203,14 +2203,14 @@
           </a:ln>
           <a:extLst>
             <a:ext uri="{909E8E84-426E-40dd-AFC4-6F175D3DCCD1}">
-              <a14:hiddenFill xmlns:a14="http://schemas.microsoft.com/office/drawing/2010/main" xmlns="">
+              <a14:hiddenFill xmlns="" xmlns:a14="http://schemas.microsoft.com/office/drawing/2010/main">
                 <a:solidFill>
                   <a:srgbClr val="FFFFFF"/>
                 </a:solidFill>
               </a14:hiddenFill>
             </a:ext>
             <a:ext uri="{91240B29-F687-4f45-9708-019B960494DF}">
-              <a14:hiddenLine xmlns:a14="http://schemas.microsoft.com/office/drawing/2010/main" xmlns="" w="9525">
+              <a14:hiddenLine xmlns="" xmlns:a14="http://schemas.microsoft.com/office/drawing/2010/main" w="9525">
                 <a:solidFill>
                   <a:srgbClr val="000000"/>
                 </a:solidFill>
@@ -2702,14 +2702,14 @@
               <ma14:placeholderFlag xmlns:ma14="http://schemas.microsoft.com/office/mac/drawingml/2011/main" val="1"/>
             </a:ext>
             <a:ext uri="{909E8E84-426E-40dd-AFC4-6F175D3DCCD1}">
-              <a14:hiddenFill xmlns:a14="http://schemas.microsoft.com/office/drawing/2010/main" xmlns="">
+              <a14:hiddenFill xmlns="" xmlns:a14="http://schemas.microsoft.com/office/drawing/2010/main">
                 <a:solidFill>
                   <a:srgbClr val="FFFFFF"/>
                 </a:solidFill>
               </a14:hiddenFill>
             </a:ext>
             <a:ext uri="{91240B29-F687-4f45-9708-019B960494DF}">
-              <a14:hiddenLine xmlns:a14="http://schemas.microsoft.com/office/drawing/2010/main" xmlns="" w="9525">
+              <a14:hiddenLine xmlns="" xmlns:a14="http://schemas.microsoft.com/office/drawing/2010/main" w="9525">
                 <a:solidFill>
                   <a:srgbClr val="000000"/>
                 </a:solidFill>
@@ -2770,14 +2770,14 @@
           <a:noFill/>
           <a:extLst>
             <a:ext uri="{909E8E84-426E-40dd-AFC4-6F175D3DCCD1}">
-              <a14:hiddenFill xmlns:a14="http://schemas.microsoft.com/office/drawing/2010/main" xmlns="">
+              <a14:hiddenFill xmlns="" xmlns:a14="http://schemas.microsoft.com/office/drawing/2010/main">
                 <a:solidFill>
                   <a:srgbClr val="FFFFFF"/>
                 </a:solidFill>
               </a14:hiddenFill>
             </a:ext>
             <a:ext uri="{91240B29-F687-4f45-9708-019B960494DF}">
-              <a14:hiddenLine xmlns:a14="http://schemas.microsoft.com/office/drawing/2010/main" xmlns="" w="9525">
+              <a14:hiddenLine xmlns="" xmlns:a14="http://schemas.microsoft.com/office/drawing/2010/main" w="9525">
                 <a:solidFill>
                   <a:srgbClr val="000000"/>
                 </a:solidFill>
@@ -2835,14 +2835,14 @@
           <a:noFill/>
           <a:extLst>
             <a:ext uri="{909E8E84-426E-40dd-AFC4-6F175D3DCCD1}">
-              <a14:hiddenFill xmlns:a14="http://schemas.microsoft.com/office/drawing/2010/main" xmlns="">
+              <a14:hiddenFill xmlns="" xmlns:a14="http://schemas.microsoft.com/office/drawing/2010/main">
                 <a:solidFill>
                   <a:srgbClr val="FFFFFF"/>
                 </a:solidFill>
               </a14:hiddenFill>
             </a:ext>
             <a:ext uri="{91240B29-F687-4f45-9708-019B960494DF}">
-              <a14:hiddenLine xmlns:a14="http://schemas.microsoft.com/office/drawing/2010/main" xmlns="" w="9525">
+              <a14:hiddenLine xmlns="" xmlns:a14="http://schemas.microsoft.com/office/drawing/2010/main" w="9525">
                 <a:solidFill>
                   <a:srgbClr val="000000"/>
                 </a:solidFill>
@@ -2898,14 +2898,14 @@
               <ma14:placeholderFlag xmlns:ma14="http://schemas.microsoft.com/office/mac/drawingml/2011/main" val="1"/>
             </a:ext>
             <a:ext uri="{909E8E84-426E-40dd-AFC4-6F175D3DCCD1}">
-              <a14:hiddenFill xmlns:a14="http://schemas.microsoft.com/office/drawing/2010/main" xmlns="">
+              <a14:hiddenFill xmlns="" xmlns:a14="http://schemas.microsoft.com/office/drawing/2010/main">
                 <a:solidFill>
                   <a:srgbClr val="FFFFFF"/>
                 </a:solidFill>
               </a14:hiddenFill>
             </a:ext>
             <a:ext uri="{91240B29-F687-4f45-9708-019B960494DF}">
-              <a14:hiddenLine xmlns:a14="http://schemas.microsoft.com/office/drawing/2010/main" xmlns="" w="9525">
+              <a14:hiddenLine xmlns="" xmlns:a14="http://schemas.microsoft.com/office/drawing/2010/main" w="9525">
                 <a:solidFill>
                   <a:srgbClr val="000000"/>
                 </a:solidFill>
@@ -2958,14 +2958,14 @@
           <a:noFill/>
           <a:extLst>
             <a:ext uri="{909E8E84-426E-40dd-AFC4-6F175D3DCCD1}">
-              <a14:hiddenFill xmlns:a14="http://schemas.microsoft.com/office/drawing/2010/main" xmlns="">
+              <a14:hiddenFill xmlns="" xmlns:a14="http://schemas.microsoft.com/office/drawing/2010/main">
                 <a:solidFill>
                   <a:srgbClr val="FFFFFF"/>
                 </a:solidFill>
               </a14:hiddenFill>
             </a:ext>
             <a:ext uri="{91240B29-F687-4f45-9708-019B960494DF}">
-              <a14:hiddenLine xmlns:a14="http://schemas.microsoft.com/office/drawing/2010/main" xmlns="" w="9525">
+              <a14:hiddenLine xmlns="" xmlns:a14="http://schemas.microsoft.com/office/drawing/2010/main" w="9525">
                 <a:solidFill>
                   <a:srgbClr val="000000"/>
                 </a:solidFill>
@@ -3018,14 +3018,14 @@
           <a:noFill/>
           <a:extLst>
             <a:ext uri="{909E8E84-426E-40dd-AFC4-6F175D3DCCD1}">
-              <a14:hiddenFill xmlns:a14="http://schemas.microsoft.com/office/drawing/2010/main" xmlns="">
+              <a14:hiddenFill xmlns="" xmlns:a14="http://schemas.microsoft.com/office/drawing/2010/main">
                 <a:solidFill>
                   <a:srgbClr val="FFFFFF"/>
                 </a:solidFill>
               </a14:hiddenFill>
             </a:ext>
             <a:ext uri="{91240B29-F687-4f45-9708-019B960494DF}">
-              <a14:hiddenLine xmlns:a14="http://schemas.microsoft.com/office/drawing/2010/main" xmlns="" w="9525">
+              <a14:hiddenLine xmlns="" xmlns:a14="http://schemas.microsoft.com/office/drawing/2010/main" w="9525">
                 <a:solidFill>
                   <a:srgbClr val="000000"/>
                 </a:solidFill>
@@ -3081,14 +3081,14 @@
               <ma14:placeholderFlag xmlns:ma14="http://schemas.microsoft.com/office/mac/drawingml/2011/main" val="1"/>
             </a:ext>
             <a:ext uri="{909E8E84-426E-40dd-AFC4-6F175D3DCCD1}">
-              <a14:hiddenFill xmlns:a14="http://schemas.microsoft.com/office/drawing/2010/main" xmlns="">
+              <a14:hiddenFill xmlns="" xmlns:a14="http://schemas.microsoft.com/office/drawing/2010/main">
                 <a:solidFill>
                   <a:srgbClr val="FFFFFF"/>
                 </a:solidFill>
               </a14:hiddenFill>
             </a:ext>
             <a:ext uri="{91240B29-F687-4f45-9708-019B960494DF}">
-              <a14:hiddenLine xmlns:a14="http://schemas.microsoft.com/office/drawing/2010/main" xmlns="" w="9525">
+              <a14:hiddenLine xmlns="" xmlns:a14="http://schemas.microsoft.com/office/drawing/2010/main" w="9525">
                 <a:solidFill>
                   <a:srgbClr val="000000"/>
                 </a:solidFill>
@@ -3136,14 +3136,14 @@
           <a:noFill/>
           <a:extLst>
             <a:ext uri="{909E8E84-426E-40dd-AFC4-6F175D3DCCD1}">
-              <a14:hiddenFill xmlns:a14="http://schemas.microsoft.com/office/drawing/2010/main" xmlns="">
+              <a14:hiddenFill xmlns="" xmlns:a14="http://schemas.microsoft.com/office/drawing/2010/main">
                 <a:solidFill>
                   <a:srgbClr val="FFFFFF"/>
                 </a:solidFill>
               </a14:hiddenFill>
             </a:ext>
             <a:ext uri="{91240B29-F687-4f45-9708-019B960494DF}">
-              <a14:hiddenLine xmlns:a14="http://schemas.microsoft.com/office/drawing/2010/main" xmlns="" w="9525">
+              <a14:hiddenLine xmlns="" xmlns:a14="http://schemas.microsoft.com/office/drawing/2010/main" w="9525">
                 <a:solidFill>
                   <a:srgbClr val="000000"/>
                 </a:solidFill>
@@ -3199,14 +3199,14 @@
               <ma14:placeholderFlag xmlns:ma14="http://schemas.microsoft.com/office/mac/drawingml/2011/main" val="1"/>
             </a:ext>
             <a:ext uri="{909E8E84-426E-40dd-AFC4-6F175D3DCCD1}">
-              <a14:hiddenFill xmlns:a14="http://schemas.microsoft.com/office/drawing/2010/main" xmlns="">
+              <a14:hiddenFill xmlns="" xmlns:a14="http://schemas.microsoft.com/office/drawing/2010/main">
                 <a:solidFill>
                   <a:srgbClr val="FFFFFF"/>
                 </a:solidFill>
               </a14:hiddenFill>
             </a:ext>
             <a:ext uri="{91240B29-F687-4f45-9708-019B960494DF}">
-              <a14:hiddenLine xmlns:a14="http://schemas.microsoft.com/office/drawing/2010/main" xmlns="" w="9525">
+              <a14:hiddenLine xmlns="" xmlns:a14="http://schemas.microsoft.com/office/drawing/2010/main" w="9525">
                 <a:solidFill>
                   <a:srgbClr val="000000"/>
                 </a:solidFill>
@@ -3257,14 +3257,14 @@
               <ma14:placeholderFlag xmlns:ma14="http://schemas.microsoft.com/office/mac/drawingml/2011/main" val="1"/>
             </a:ext>
             <a:ext uri="{909E8E84-426E-40dd-AFC4-6F175D3DCCD1}">
-              <a14:hiddenFill xmlns:a14="http://schemas.microsoft.com/office/drawing/2010/main" xmlns="">
+              <a14:hiddenFill xmlns="" xmlns:a14="http://schemas.microsoft.com/office/drawing/2010/main">
                 <a:solidFill>
                   <a:srgbClr val="FFFFFF"/>
                 </a:solidFill>
               </a14:hiddenFill>
             </a:ext>
             <a:ext uri="{91240B29-F687-4f45-9708-019B960494DF}">
-              <a14:hiddenLine xmlns:a14="http://schemas.microsoft.com/office/drawing/2010/main" xmlns="" w="9525">
+              <a14:hiddenLine xmlns="" xmlns:a14="http://schemas.microsoft.com/office/drawing/2010/main" w="9525">
                 <a:solidFill>
                   <a:srgbClr val="000000"/>
                 </a:solidFill>
@@ -3316,14 +3316,14 @@
               <ma14:placeholderFlag xmlns:ma14="http://schemas.microsoft.com/office/mac/drawingml/2011/main" val="1"/>
             </a:ext>
             <a:ext uri="{909E8E84-426E-40dd-AFC4-6F175D3DCCD1}">
-              <a14:hiddenFill xmlns:a14="http://schemas.microsoft.com/office/drawing/2010/main" xmlns="">
+              <a14:hiddenFill xmlns="" xmlns:a14="http://schemas.microsoft.com/office/drawing/2010/main">
                 <a:solidFill>
                   <a:srgbClr val="FFFFFF"/>
                 </a:solidFill>
               </a14:hiddenFill>
             </a:ext>
             <a:ext uri="{91240B29-F687-4f45-9708-019B960494DF}">
-              <a14:hiddenLine xmlns:a14="http://schemas.microsoft.com/office/drawing/2010/main" xmlns="" w="9525">
+              <a14:hiddenLine xmlns="" xmlns:a14="http://schemas.microsoft.com/office/drawing/2010/main" w="9525">
                 <a:solidFill>
                   <a:srgbClr val="000000"/>
                 </a:solidFill>
@@ -3384,14 +3384,14 @@
           <a:noFill/>
           <a:extLst>
             <a:ext uri="{909E8E84-426E-40dd-AFC4-6F175D3DCCD1}">
-              <a14:hiddenFill xmlns:a14="http://schemas.microsoft.com/office/drawing/2010/main" xmlns="">
+              <a14:hiddenFill xmlns="" xmlns:a14="http://schemas.microsoft.com/office/drawing/2010/main">
                 <a:solidFill>
                   <a:srgbClr val="FFFFFF"/>
                 </a:solidFill>
               </a14:hiddenFill>
             </a:ext>
             <a:ext uri="{91240B29-F687-4f45-9708-019B960494DF}">
-              <a14:hiddenLine xmlns:a14="http://schemas.microsoft.com/office/drawing/2010/main" xmlns="" w="9525">
+              <a14:hiddenLine xmlns="" xmlns:a14="http://schemas.microsoft.com/office/drawing/2010/main" w="9525">
                 <a:solidFill>
                   <a:srgbClr val="000000"/>
                 </a:solidFill>
@@ -3457,10 +3457,6 @@
               <a:rPr lang="it-IT" dirty="0" smtClean="0"/>
               <a:t>: Smart Home Natural Language Interface </a:t>
             </a:r>
-            <a:r>
-              <a:rPr lang="it-IT" dirty="0" smtClean="0"/>
-              <a:t/>
-            </a:r>
             <a:br>
               <a:rPr lang="it-IT" dirty="0" smtClean="0"/>
             </a:br>
@@ -3490,14 +3486,14 @@
           <a:noFill/>
           <a:extLst>
             <a:ext uri="{909E8E84-426E-40dd-AFC4-6F175D3DCCD1}">
-              <a14:hiddenFill xmlns:a14="http://schemas.microsoft.com/office/drawing/2010/main" xmlns="">
+              <a14:hiddenFill xmlns="" xmlns:a14="http://schemas.microsoft.com/office/drawing/2010/main">
                 <a:solidFill>
                   <a:srgbClr val="FFFFFF"/>
                 </a:solidFill>
               </a14:hiddenFill>
             </a:ext>
             <a:ext uri="{91240B29-F687-4f45-9708-019B960494DF}">
-              <a14:hiddenLine xmlns:a14="http://schemas.microsoft.com/office/drawing/2010/main" xmlns="" w="9525">
+              <a14:hiddenLine xmlns="" xmlns:a14="http://schemas.microsoft.com/office/drawing/2010/main" w="9525">
                 <a:solidFill>
                   <a:srgbClr val="000000"/>
                 </a:solidFill>
@@ -3553,14 +3549,14 @@
               <ma14:placeholderFlag xmlns:ma14="http://schemas.microsoft.com/office/mac/drawingml/2011/main" val="1"/>
             </a:ext>
             <a:ext uri="{909E8E84-426E-40dd-AFC4-6F175D3DCCD1}">
-              <a14:hiddenFill xmlns:a14="http://schemas.microsoft.com/office/drawing/2010/main" xmlns="">
+              <a14:hiddenFill xmlns="" xmlns:a14="http://schemas.microsoft.com/office/drawing/2010/main">
                 <a:solidFill>
                   <a:srgbClr val="FFFFFF"/>
                 </a:solidFill>
               </a14:hiddenFill>
             </a:ext>
             <a:ext uri="{91240B29-F687-4f45-9708-019B960494DF}">
-              <a14:hiddenLine xmlns:a14="http://schemas.microsoft.com/office/drawing/2010/main" xmlns="" w="9525">
+              <a14:hiddenLine xmlns="" xmlns:a14="http://schemas.microsoft.com/office/drawing/2010/main" w="9525">
                 <a:solidFill>
                   <a:srgbClr val="000000"/>
                 </a:solidFill>
@@ -3603,8 +3599,8 @@
         </p:nvSpPr>
         <p:spPr>
           <a:xfrm>
-            <a:off x="5388883" y="15654363"/>
-            <a:ext cx="4557486" cy="307777"/>
+            <a:off x="5378944" y="15654363"/>
+            <a:ext cx="4557486" cy="3108543"/>
           </a:xfrm>
           <a:prstGeom prst="rect">
             <a:avLst/>
@@ -3621,6 +3617,70 @@
               <a:rPr lang="it-IT" sz="1400" b="1" dirty="0" smtClean="0"/>
               <a:t>Obiettivi</a:t>
             </a:r>
+          </a:p>
+          <a:p>
+            <a:r>
+              <a:rPr lang="it-IT" sz="1400" dirty="0" smtClean="0"/>
+              <a:t>Gli obbiettivi del progetto consistono in:</a:t>
+            </a:r>
+          </a:p>
+          <a:p>
+            <a:pPr marL="285750" indent="-285750">
+              <a:buFont typeface="Arial" charset="0"/>
+              <a:buChar char="•"/>
+            </a:pPr>
+            <a:r>
+              <a:rPr lang="it-IT" sz="1400" dirty="0"/>
+              <a:t>Studiare il sistema domotico esistente nel laboratorio e comprenderne i meccanismi di funzionamento </a:t>
+            </a:r>
+          </a:p>
+          <a:p>
+            <a:pPr marL="285750" indent="-285750">
+              <a:buFont typeface="Arial" charset="0"/>
+              <a:buChar char="•"/>
+            </a:pPr>
+            <a:r>
+              <a:rPr lang="it-IT" sz="1400" dirty="0"/>
+              <a:t>Approfondire la conoscenza della Internet of </a:t>
+            </a:r>
+            <a:r>
+              <a:rPr lang="it-IT" sz="1400" dirty="0" err="1"/>
+              <a:t>Things</a:t>
+            </a:r>
+            <a:r>
+              <a:rPr lang="it-IT" sz="1400" dirty="0"/>
+              <a:t> </a:t>
+            </a:r>
+          </a:p>
+          <a:p>
+            <a:pPr marL="285750" indent="-285750">
+              <a:buFont typeface="Arial" charset="0"/>
+              <a:buChar char="•"/>
+            </a:pPr>
+            <a:r>
+              <a:rPr lang="it-IT" sz="1400" dirty="0"/>
+              <a:t>Apprendere meccanismi di NLP (Natural Language Processing) </a:t>
+            </a:r>
+          </a:p>
+          <a:p>
+            <a:pPr marL="285750" indent="-285750">
+              <a:buFont typeface="Arial" charset="0"/>
+              <a:buChar char="•"/>
+            </a:pPr>
+            <a:r>
+              <a:rPr lang="it-IT" sz="1400" dirty="0"/>
+              <a:t>Far comunicare sistemi eterogenei scritti con tecnologie differenti </a:t>
+            </a:r>
+            <a:endParaRPr lang="it-IT" sz="1400" dirty="0" smtClean="0"/>
+          </a:p>
+          <a:p>
+            <a:r>
+              <a:rPr lang="it-IT" sz="1400" dirty="0" smtClean="0"/>
+              <a:t>In particolare si vuole migliorare la qualità dell’interfaccia vocale presente nel sistema, cercando di rendere la conversazione libera da vincoli.</a:t>
+            </a:r>
+            <a:endParaRPr lang="it-IT" sz="1400" dirty="0"/>
+          </a:p>
+          <a:p>
             <a:endParaRPr lang="it-IT" sz="1400" dirty="0" smtClean="0"/>
           </a:p>
         </p:txBody>
@@ -3673,11 +3733,7 @@
           <a:p>
             <a:r>
               <a:rPr lang="it-IT" sz="1400" dirty="0" smtClean="0"/>
-              <a:t>La flessibilità del sistema riesce a garantire una conversazione pi</a:t>
-            </a:r>
-            <a:r>
-              <a:rPr lang="it-IT" sz="1400" dirty="0" smtClean="0"/>
-              <a:t>ù naturale rispetto al prodotto precedente, </a:t>
+              <a:t>La flessibilità del sistema riesce a garantire una conversazione più naturale rispetto al prodotto precedente, </a:t>
             </a:r>
           </a:p>
           <a:p>

</xml_diff>

<commit_message>
Updated date. New poster. Updated presentation.
</commit_message>
<xml_diff>
--- a/doc/poster.pptx
+++ b/doc/poster.pptx
@@ -273,7 +273,7 @@
               <a:pPr>
                 <a:defRPr/>
               </a:pPr>
-              <a:t>02.09.16</a:t>
+              <a:t>08.09.16</a:t>
             </a:fld>
             <a:endParaRPr lang="it-IT"/>
           </a:p>
@@ -497,7 +497,7 @@
               <a:pPr>
                 <a:defRPr/>
               </a:pPr>
-              <a:t>02.09.16</a:t>
+              <a:t>08.09.16</a:t>
             </a:fld>
             <a:endParaRPr lang="it-IT"/>
           </a:p>
@@ -1073,14 +1073,14 @@
           </a:ln>
           <a:extLst>
             <a:ext uri="{909E8E84-426E-40dd-AFC4-6F175D3DCCD1}">
-              <a14:hiddenFill xmlns:a14="http://schemas.microsoft.com/office/drawing/2010/main" xmlns="">
+              <a14:hiddenFill xmlns="" xmlns:a14="http://schemas.microsoft.com/office/drawing/2010/main">
                 <a:solidFill>
                   <a:srgbClr val="FFFFFF"/>
                 </a:solidFill>
               </a14:hiddenFill>
             </a:ext>
             <a:ext uri="{91240B29-F687-4f45-9708-019B960494DF}">
-              <a14:hiddenLine xmlns:a14="http://schemas.microsoft.com/office/drawing/2010/main" xmlns="" w="9525">
+              <a14:hiddenLine xmlns="" xmlns:a14="http://schemas.microsoft.com/office/drawing/2010/main" w="9525">
                 <a:solidFill>
                   <a:srgbClr val="000000"/>
                 </a:solidFill>
@@ -1762,14 +1762,14 @@
           </a:ln>
           <a:extLst>
             <a:ext uri="{909E8E84-426E-40dd-AFC4-6F175D3DCCD1}">
-              <a14:hiddenFill xmlns:a14="http://schemas.microsoft.com/office/drawing/2010/main" xmlns="">
+              <a14:hiddenFill xmlns="" xmlns:a14="http://schemas.microsoft.com/office/drawing/2010/main">
                 <a:solidFill>
                   <a:srgbClr val="FFFFFF"/>
                 </a:solidFill>
               </a14:hiddenFill>
             </a:ext>
             <a:ext uri="{91240B29-F687-4f45-9708-019B960494DF}">
-              <a14:hiddenLine xmlns:a14="http://schemas.microsoft.com/office/drawing/2010/main" xmlns="" w="9525">
+              <a14:hiddenLine xmlns="" xmlns:a14="http://schemas.microsoft.com/office/drawing/2010/main" w="9525">
                 <a:solidFill>
                   <a:srgbClr val="000000"/>
                 </a:solidFill>
@@ -1923,14 +1923,14 @@
           </a:ln>
           <a:extLst>
             <a:ext uri="{909E8E84-426E-40dd-AFC4-6F175D3DCCD1}">
-              <a14:hiddenFill xmlns:a14="http://schemas.microsoft.com/office/drawing/2010/main" xmlns="">
+              <a14:hiddenFill xmlns="" xmlns:a14="http://schemas.microsoft.com/office/drawing/2010/main">
                 <a:solidFill>
                   <a:srgbClr val="FFFFFF"/>
                 </a:solidFill>
               </a14:hiddenFill>
             </a:ext>
             <a:ext uri="{91240B29-F687-4f45-9708-019B960494DF}">
-              <a14:hiddenLine xmlns:a14="http://schemas.microsoft.com/office/drawing/2010/main" xmlns="" w="9525">
+              <a14:hiddenLine xmlns="" xmlns:a14="http://schemas.microsoft.com/office/drawing/2010/main" w="9525">
                 <a:solidFill>
                   <a:srgbClr val="000000"/>
                 </a:solidFill>
@@ -2012,14 +2012,14 @@
           </a:ln>
           <a:extLst>
             <a:ext uri="{909E8E84-426E-40dd-AFC4-6F175D3DCCD1}">
-              <a14:hiddenFill xmlns:a14="http://schemas.microsoft.com/office/drawing/2010/main" xmlns="">
+              <a14:hiddenFill xmlns="" xmlns:a14="http://schemas.microsoft.com/office/drawing/2010/main">
                 <a:solidFill>
                   <a:srgbClr val="FFFFFF"/>
                 </a:solidFill>
               </a14:hiddenFill>
             </a:ext>
             <a:ext uri="{91240B29-F687-4f45-9708-019B960494DF}">
-              <a14:hiddenLine xmlns:a14="http://schemas.microsoft.com/office/drawing/2010/main" xmlns="" w="9525">
+              <a14:hiddenLine xmlns="" xmlns:a14="http://schemas.microsoft.com/office/drawing/2010/main" w="9525">
                 <a:solidFill>
                   <a:srgbClr val="000000"/>
                 </a:solidFill>
@@ -2149,14 +2149,14 @@
           </a:ln>
           <a:extLst>
             <a:ext uri="{909E8E84-426E-40dd-AFC4-6F175D3DCCD1}">
-              <a14:hiddenFill xmlns:a14="http://schemas.microsoft.com/office/drawing/2010/main" xmlns="">
+              <a14:hiddenFill xmlns="" xmlns:a14="http://schemas.microsoft.com/office/drawing/2010/main">
                 <a:solidFill>
                   <a:srgbClr val="FFFFFF"/>
                 </a:solidFill>
               </a14:hiddenFill>
             </a:ext>
             <a:ext uri="{91240B29-F687-4f45-9708-019B960494DF}">
-              <a14:hiddenLine xmlns:a14="http://schemas.microsoft.com/office/drawing/2010/main" xmlns="" w="9525">
+              <a14:hiddenLine xmlns="" xmlns:a14="http://schemas.microsoft.com/office/drawing/2010/main" w="9525">
                 <a:solidFill>
                   <a:srgbClr val="000000"/>
                 </a:solidFill>
@@ -2203,14 +2203,14 @@
           </a:ln>
           <a:extLst>
             <a:ext uri="{909E8E84-426E-40dd-AFC4-6F175D3DCCD1}">
-              <a14:hiddenFill xmlns:a14="http://schemas.microsoft.com/office/drawing/2010/main" xmlns="">
+              <a14:hiddenFill xmlns="" xmlns:a14="http://schemas.microsoft.com/office/drawing/2010/main">
                 <a:solidFill>
                   <a:srgbClr val="FFFFFF"/>
                 </a:solidFill>
               </a14:hiddenFill>
             </a:ext>
             <a:ext uri="{91240B29-F687-4f45-9708-019B960494DF}">
-              <a14:hiddenLine xmlns:a14="http://schemas.microsoft.com/office/drawing/2010/main" xmlns="" w="9525">
+              <a14:hiddenLine xmlns="" xmlns:a14="http://schemas.microsoft.com/office/drawing/2010/main" w="9525">
                 <a:solidFill>
                   <a:srgbClr val="000000"/>
                 </a:solidFill>
@@ -2702,14 +2702,14 @@
               <ma14:placeholderFlag xmlns:ma14="http://schemas.microsoft.com/office/mac/drawingml/2011/main" val="1"/>
             </a:ext>
             <a:ext uri="{909E8E84-426E-40dd-AFC4-6F175D3DCCD1}">
-              <a14:hiddenFill xmlns:a14="http://schemas.microsoft.com/office/drawing/2010/main" xmlns="">
+              <a14:hiddenFill xmlns="" xmlns:a14="http://schemas.microsoft.com/office/drawing/2010/main">
                 <a:solidFill>
                   <a:srgbClr val="FFFFFF"/>
                 </a:solidFill>
               </a14:hiddenFill>
             </a:ext>
             <a:ext uri="{91240B29-F687-4f45-9708-019B960494DF}">
-              <a14:hiddenLine xmlns:a14="http://schemas.microsoft.com/office/drawing/2010/main" xmlns="" w="9525">
+              <a14:hiddenLine xmlns="" xmlns:a14="http://schemas.microsoft.com/office/drawing/2010/main" w="9525">
                 <a:solidFill>
                   <a:srgbClr val="000000"/>
                 </a:solidFill>
@@ -2770,14 +2770,14 @@
           <a:noFill/>
           <a:extLst>
             <a:ext uri="{909E8E84-426E-40dd-AFC4-6F175D3DCCD1}">
-              <a14:hiddenFill xmlns:a14="http://schemas.microsoft.com/office/drawing/2010/main" xmlns="">
+              <a14:hiddenFill xmlns="" xmlns:a14="http://schemas.microsoft.com/office/drawing/2010/main">
                 <a:solidFill>
                   <a:srgbClr val="FFFFFF"/>
                 </a:solidFill>
               </a14:hiddenFill>
             </a:ext>
             <a:ext uri="{91240B29-F687-4f45-9708-019B960494DF}">
-              <a14:hiddenLine xmlns:a14="http://schemas.microsoft.com/office/drawing/2010/main" xmlns="" w="9525">
+              <a14:hiddenLine xmlns="" xmlns:a14="http://schemas.microsoft.com/office/drawing/2010/main" w="9525">
                 <a:solidFill>
                   <a:srgbClr val="000000"/>
                 </a:solidFill>
@@ -2835,14 +2835,14 @@
           <a:noFill/>
           <a:extLst>
             <a:ext uri="{909E8E84-426E-40dd-AFC4-6F175D3DCCD1}">
-              <a14:hiddenFill xmlns:a14="http://schemas.microsoft.com/office/drawing/2010/main" xmlns="">
+              <a14:hiddenFill xmlns="" xmlns:a14="http://schemas.microsoft.com/office/drawing/2010/main">
                 <a:solidFill>
                   <a:srgbClr val="FFFFFF"/>
                 </a:solidFill>
               </a14:hiddenFill>
             </a:ext>
             <a:ext uri="{91240B29-F687-4f45-9708-019B960494DF}">
-              <a14:hiddenLine xmlns:a14="http://schemas.microsoft.com/office/drawing/2010/main" xmlns="" w="9525">
+              <a14:hiddenLine xmlns="" xmlns:a14="http://schemas.microsoft.com/office/drawing/2010/main" w="9525">
                 <a:solidFill>
                   <a:srgbClr val="000000"/>
                 </a:solidFill>
@@ -2898,14 +2898,14 @@
               <ma14:placeholderFlag xmlns:ma14="http://schemas.microsoft.com/office/mac/drawingml/2011/main" val="1"/>
             </a:ext>
             <a:ext uri="{909E8E84-426E-40dd-AFC4-6F175D3DCCD1}">
-              <a14:hiddenFill xmlns:a14="http://schemas.microsoft.com/office/drawing/2010/main" xmlns="">
+              <a14:hiddenFill xmlns="" xmlns:a14="http://schemas.microsoft.com/office/drawing/2010/main">
                 <a:solidFill>
                   <a:srgbClr val="FFFFFF"/>
                 </a:solidFill>
               </a14:hiddenFill>
             </a:ext>
             <a:ext uri="{91240B29-F687-4f45-9708-019B960494DF}">
-              <a14:hiddenLine xmlns:a14="http://schemas.microsoft.com/office/drawing/2010/main" xmlns="" w="9525">
+              <a14:hiddenLine xmlns="" xmlns:a14="http://schemas.microsoft.com/office/drawing/2010/main" w="9525">
                 <a:solidFill>
                   <a:srgbClr val="000000"/>
                 </a:solidFill>
@@ -2958,14 +2958,14 @@
           <a:noFill/>
           <a:extLst>
             <a:ext uri="{909E8E84-426E-40dd-AFC4-6F175D3DCCD1}">
-              <a14:hiddenFill xmlns:a14="http://schemas.microsoft.com/office/drawing/2010/main" xmlns="">
+              <a14:hiddenFill xmlns="" xmlns:a14="http://schemas.microsoft.com/office/drawing/2010/main">
                 <a:solidFill>
                   <a:srgbClr val="FFFFFF"/>
                 </a:solidFill>
               </a14:hiddenFill>
             </a:ext>
             <a:ext uri="{91240B29-F687-4f45-9708-019B960494DF}">
-              <a14:hiddenLine xmlns:a14="http://schemas.microsoft.com/office/drawing/2010/main" xmlns="" w="9525">
+              <a14:hiddenLine xmlns="" xmlns:a14="http://schemas.microsoft.com/office/drawing/2010/main" w="9525">
                 <a:solidFill>
                   <a:srgbClr val="000000"/>
                 </a:solidFill>
@@ -3018,14 +3018,14 @@
           <a:noFill/>
           <a:extLst>
             <a:ext uri="{909E8E84-426E-40dd-AFC4-6F175D3DCCD1}">
-              <a14:hiddenFill xmlns:a14="http://schemas.microsoft.com/office/drawing/2010/main" xmlns="">
+              <a14:hiddenFill xmlns="" xmlns:a14="http://schemas.microsoft.com/office/drawing/2010/main">
                 <a:solidFill>
                   <a:srgbClr val="FFFFFF"/>
                 </a:solidFill>
               </a14:hiddenFill>
             </a:ext>
             <a:ext uri="{91240B29-F687-4f45-9708-019B960494DF}">
-              <a14:hiddenLine xmlns:a14="http://schemas.microsoft.com/office/drawing/2010/main" xmlns="" w="9525">
+              <a14:hiddenLine xmlns="" xmlns:a14="http://schemas.microsoft.com/office/drawing/2010/main" w="9525">
                 <a:solidFill>
                   <a:srgbClr val="000000"/>
                 </a:solidFill>
@@ -3081,14 +3081,14 @@
               <ma14:placeholderFlag xmlns:ma14="http://schemas.microsoft.com/office/mac/drawingml/2011/main" val="1"/>
             </a:ext>
             <a:ext uri="{909E8E84-426E-40dd-AFC4-6F175D3DCCD1}">
-              <a14:hiddenFill xmlns:a14="http://schemas.microsoft.com/office/drawing/2010/main" xmlns="">
+              <a14:hiddenFill xmlns="" xmlns:a14="http://schemas.microsoft.com/office/drawing/2010/main">
                 <a:solidFill>
                   <a:srgbClr val="FFFFFF"/>
                 </a:solidFill>
               </a14:hiddenFill>
             </a:ext>
             <a:ext uri="{91240B29-F687-4f45-9708-019B960494DF}">
-              <a14:hiddenLine xmlns:a14="http://schemas.microsoft.com/office/drawing/2010/main" xmlns="" w="9525">
+              <a14:hiddenLine xmlns="" xmlns:a14="http://schemas.microsoft.com/office/drawing/2010/main" w="9525">
                 <a:solidFill>
                   <a:srgbClr val="000000"/>
                 </a:solidFill>
@@ -3136,14 +3136,14 @@
           <a:noFill/>
           <a:extLst>
             <a:ext uri="{909E8E84-426E-40dd-AFC4-6F175D3DCCD1}">
-              <a14:hiddenFill xmlns:a14="http://schemas.microsoft.com/office/drawing/2010/main" xmlns="">
+              <a14:hiddenFill xmlns="" xmlns:a14="http://schemas.microsoft.com/office/drawing/2010/main">
                 <a:solidFill>
                   <a:srgbClr val="FFFFFF"/>
                 </a:solidFill>
               </a14:hiddenFill>
             </a:ext>
             <a:ext uri="{91240B29-F687-4f45-9708-019B960494DF}">
-              <a14:hiddenLine xmlns:a14="http://schemas.microsoft.com/office/drawing/2010/main" xmlns="" w="9525">
+              <a14:hiddenLine xmlns="" xmlns:a14="http://schemas.microsoft.com/office/drawing/2010/main" w="9525">
                 <a:solidFill>
                   <a:srgbClr val="000000"/>
                 </a:solidFill>
@@ -3199,14 +3199,14 @@
               <ma14:placeholderFlag xmlns:ma14="http://schemas.microsoft.com/office/mac/drawingml/2011/main" val="1"/>
             </a:ext>
             <a:ext uri="{909E8E84-426E-40dd-AFC4-6F175D3DCCD1}">
-              <a14:hiddenFill xmlns:a14="http://schemas.microsoft.com/office/drawing/2010/main" xmlns="">
+              <a14:hiddenFill xmlns="" xmlns:a14="http://schemas.microsoft.com/office/drawing/2010/main">
                 <a:solidFill>
                   <a:srgbClr val="FFFFFF"/>
                 </a:solidFill>
               </a14:hiddenFill>
             </a:ext>
             <a:ext uri="{91240B29-F687-4f45-9708-019B960494DF}">
-              <a14:hiddenLine xmlns:a14="http://schemas.microsoft.com/office/drawing/2010/main" xmlns="" w="9525">
+              <a14:hiddenLine xmlns="" xmlns:a14="http://schemas.microsoft.com/office/drawing/2010/main" w="9525">
                 <a:solidFill>
                   <a:srgbClr val="000000"/>
                 </a:solidFill>
@@ -3257,14 +3257,14 @@
               <ma14:placeholderFlag xmlns:ma14="http://schemas.microsoft.com/office/mac/drawingml/2011/main" val="1"/>
             </a:ext>
             <a:ext uri="{909E8E84-426E-40dd-AFC4-6F175D3DCCD1}">
-              <a14:hiddenFill xmlns:a14="http://schemas.microsoft.com/office/drawing/2010/main" xmlns="">
+              <a14:hiddenFill xmlns="" xmlns:a14="http://schemas.microsoft.com/office/drawing/2010/main">
                 <a:solidFill>
                   <a:srgbClr val="FFFFFF"/>
                 </a:solidFill>
               </a14:hiddenFill>
             </a:ext>
             <a:ext uri="{91240B29-F687-4f45-9708-019B960494DF}">
-              <a14:hiddenLine xmlns:a14="http://schemas.microsoft.com/office/drawing/2010/main" xmlns="" w="9525">
+              <a14:hiddenLine xmlns="" xmlns:a14="http://schemas.microsoft.com/office/drawing/2010/main" w="9525">
                 <a:solidFill>
                   <a:srgbClr val="000000"/>
                 </a:solidFill>
@@ -3316,14 +3316,14 @@
               <ma14:placeholderFlag xmlns:ma14="http://schemas.microsoft.com/office/mac/drawingml/2011/main" val="1"/>
             </a:ext>
             <a:ext uri="{909E8E84-426E-40dd-AFC4-6F175D3DCCD1}">
-              <a14:hiddenFill xmlns:a14="http://schemas.microsoft.com/office/drawing/2010/main" xmlns="">
+              <a14:hiddenFill xmlns="" xmlns:a14="http://schemas.microsoft.com/office/drawing/2010/main">
                 <a:solidFill>
                   <a:srgbClr val="FFFFFF"/>
                 </a:solidFill>
               </a14:hiddenFill>
             </a:ext>
             <a:ext uri="{91240B29-F687-4f45-9708-019B960494DF}">
-              <a14:hiddenLine xmlns:a14="http://schemas.microsoft.com/office/drawing/2010/main" xmlns="" w="9525">
+              <a14:hiddenLine xmlns="" xmlns:a14="http://schemas.microsoft.com/office/drawing/2010/main" w="9525">
                 <a:solidFill>
                   <a:srgbClr val="000000"/>
                 </a:solidFill>
@@ -3384,14 +3384,14 @@
           <a:noFill/>
           <a:extLst>
             <a:ext uri="{909E8E84-426E-40dd-AFC4-6F175D3DCCD1}">
-              <a14:hiddenFill xmlns:a14="http://schemas.microsoft.com/office/drawing/2010/main" xmlns="">
+              <a14:hiddenFill xmlns="" xmlns:a14="http://schemas.microsoft.com/office/drawing/2010/main">
                 <a:solidFill>
                   <a:srgbClr val="FFFFFF"/>
                 </a:solidFill>
               </a14:hiddenFill>
             </a:ext>
             <a:ext uri="{91240B29-F687-4f45-9708-019B960494DF}">
-              <a14:hiddenLine xmlns:a14="http://schemas.microsoft.com/office/drawing/2010/main" xmlns="" w="9525">
+              <a14:hiddenLine xmlns="" xmlns:a14="http://schemas.microsoft.com/office/drawing/2010/main" w="9525">
                 <a:solidFill>
                   <a:srgbClr val="000000"/>
                 </a:solidFill>
@@ -3486,14 +3486,14 @@
           <a:noFill/>
           <a:extLst>
             <a:ext uri="{909E8E84-426E-40dd-AFC4-6F175D3DCCD1}">
-              <a14:hiddenFill xmlns:a14="http://schemas.microsoft.com/office/drawing/2010/main" xmlns="">
+              <a14:hiddenFill xmlns="" xmlns:a14="http://schemas.microsoft.com/office/drawing/2010/main">
                 <a:solidFill>
                   <a:srgbClr val="FFFFFF"/>
                 </a:solidFill>
               </a14:hiddenFill>
             </a:ext>
             <a:ext uri="{91240B29-F687-4f45-9708-019B960494DF}">
-              <a14:hiddenLine xmlns:a14="http://schemas.microsoft.com/office/drawing/2010/main" xmlns="" w="9525">
+              <a14:hiddenLine xmlns="" xmlns:a14="http://schemas.microsoft.com/office/drawing/2010/main" w="9525">
                 <a:solidFill>
                   <a:srgbClr val="000000"/>
                 </a:solidFill>
@@ -3549,14 +3549,14 @@
               <ma14:placeholderFlag xmlns:ma14="http://schemas.microsoft.com/office/mac/drawingml/2011/main" val="1"/>
             </a:ext>
             <a:ext uri="{909E8E84-426E-40dd-AFC4-6F175D3DCCD1}">
-              <a14:hiddenFill xmlns:a14="http://schemas.microsoft.com/office/drawing/2010/main" xmlns="">
+              <a14:hiddenFill xmlns="" xmlns:a14="http://schemas.microsoft.com/office/drawing/2010/main">
                 <a:solidFill>
                   <a:srgbClr val="FFFFFF"/>
                 </a:solidFill>
               </a14:hiddenFill>
             </a:ext>
             <a:ext uri="{91240B29-F687-4f45-9708-019B960494DF}">
-              <a14:hiddenLine xmlns:a14="http://schemas.microsoft.com/office/drawing/2010/main" xmlns="" w="9525">
+              <a14:hiddenLine xmlns="" xmlns:a14="http://schemas.microsoft.com/office/drawing/2010/main" w="9525">
                 <a:solidFill>
                   <a:srgbClr val="000000"/>
                 </a:solidFill>
@@ -3721,25 +3721,55 @@
           <a:p>
             <a:r>
               <a:rPr lang="it-IT" sz="1400" dirty="0" smtClean="0"/>
-              <a:t>L'architettura realizzata ha dimostrato come sia possibile realizzare un'Agente in grado comprendere comandi in modalità di ascolto always-on e che provveda alla loro interpretazione senza che siano presenti vincoli ai quali l'utente si deve attenere.</a:t>
-            </a:r>
-          </a:p>
-          <a:p>
+              <a:t>L'architettura realizzata ha dimostrato come sia possibile realizzare un'Agente in grado </a:t>
+            </a:r>
             <a:r>
               <a:rPr lang="it-IT" sz="1400" dirty="0" smtClean="0"/>
-              <a:t>Quanto realizzato è in grado di apprendere dall'utente nuovi modi di interagire con il comando, il quale può quindi addestrare il sistema per farlo aderire alle sue esigenze e migliorarne le performance.</a:t>
-            </a:r>
-          </a:p>
-          <a:p>
+              <a:t>di comprendere </a:t>
+            </a:r>
             <a:r>
               <a:rPr lang="it-IT" sz="1400" dirty="0" smtClean="0"/>
-              <a:t>La flessibilità del sistema riesce a garantire una conversazione più naturale rispetto al prodotto precedente, </a:t>
-            </a:r>
-          </a:p>
-          <a:p>
+              <a:t>comandi in modalità di ascolto always-on e che provveda alla loro interpretazione senza che siano presenti vincoli ai quali l'utente si deve attenere.</a:t>
+            </a:r>
+          </a:p>
+          <a:p>
+            <a:r>
+              <a:rPr lang="it-IT" sz="1400" dirty="0"/>
+              <a:t>Quanto realizzato è in grado di apprendere nuovi modi di interagire con i comandi, l'utente può quindi addestrare il sistema per farlo aderire alle sue esigenze e migliorarne le performance</a:t>
+            </a:r>
             <a:r>
               <a:rPr lang="it-IT" sz="1400" dirty="0" smtClean="0"/>
-              <a:t>L’assenza di regole fisse solleva l’utente dal dover pensare a come trasmettere il comando al sistema, in quanto può comportarsi come durante una normale conversazione; questo permette quindi anche gli utenti meno esperti di interagire con il sistema.</a:t>
+              <a:t>.</a:t>
+            </a:r>
+            <a:endParaRPr lang="it-IT" sz="1400" dirty="0" smtClean="0"/>
+          </a:p>
+          <a:p>
+            <a:r>
+              <a:rPr lang="it-IT" sz="1400" dirty="0" smtClean="0"/>
+              <a:t>La flessibilità del sistema riesce a garantire una conversazione più naturale rispetto al prodotto </a:t>
+            </a:r>
+            <a:r>
+              <a:rPr lang="it-IT" sz="1400" dirty="0" smtClean="0"/>
+              <a:t>precedente. </a:t>
+            </a:r>
+            <a:endParaRPr lang="it-IT" sz="1400" dirty="0" smtClean="0"/>
+          </a:p>
+          <a:p>
+            <a:r>
+              <a:rPr lang="it-IT" sz="1400" dirty="0" smtClean="0"/>
+              <a:t>L’assenza di regole fisse solleva l’utente dal dover pensare a come trasmettere il comando al sistema, in quanto può comportarsi come durante una normale conversazione; questo permette quindi anche gli utenti meno esperti di interagire </a:t>
+            </a:r>
+            <a:r>
+              <a:rPr lang="it-IT" sz="1400" smtClean="0"/>
+              <a:t>con </a:t>
+            </a:r>
+            <a:r>
+              <a:rPr lang="it-IT" sz="1400" smtClean="0"/>
+              <a:t>l’Agente</a:t>
+            </a:r>
+            <a:r>
+              <a:rPr lang="it-IT" sz="1400" smtClean="0"/>
+              <a:t>.</a:t>
             </a:r>
             <a:endParaRPr lang="it-IT" sz="1400" dirty="0"/>
           </a:p>
@@ -3754,7 +3784,7 @@
         <p:spPr>
           <a:xfrm>
             <a:off x="715963" y="15654363"/>
-            <a:ext cx="4557486" cy="4832092"/>
+            <a:ext cx="4557486" cy="4401205"/>
           </a:xfrm>
           <a:prstGeom prst="rect">
             <a:avLst/>
@@ -3778,38 +3808,77 @@
           </a:p>
           <a:p>
             <a:r>
+              <a:rPr lang="it-IT" sz="1400" dirty="0"/>
+              <a:t>Le interfacce basate su riconoscimento vocale sono estremamente efficaci, ma vengono spesso criticate per la loro </a:t>
+            </a:r>
+            <a:r>
               <a:rPr lang="it-IT" sz="1400" dirty="0" smtClean="0"/>
-              <a:t>Le interfacce in linguaggio naturale permettono all’utente di controllare un sistema attraverso la voce. Esse sono estremamente efficaci, ma vengono spesso criticate per la loro rigidità.</a:t>
-            </a:r>
-          </a:p>
-          <a:p>
+              <a:t>rigidità.</a:t>
+            </a:r>
+            <a:r>
+              <a:rPr lang="it-IT" sz="1400" dirty="0"/>
+              <a:t/>
+            </a:r>
+            <a:br>
+              <a:rPr lang="it-IT" sz="1400" dirty="0"/>
+            </a:br>
+            <a:r>
+              <a:rPr lang="it-IT" sz="1400" dirty="0"/>
+              <a:t>I metodi generalmente utilizzati per la costruzione di queste interfacce sono basati su un sistema di regole, dette grammatiche, alle quali l’utente si deve attenere per l’interazione. </a:t>
+            </a:r>
+            <a:endParaRPr lang="it-IT" sz="1400" dirty="0"/>
+          </a:p>
+          <a:p>
+            <a:r>
+              <a:rPr lang="it-IT" sz="1400" dirty="0"/>
+              <a:t>Il sistema introduce una nuova metodologia di associazione delle frasi pronunciate </a:t>
+            </a:r>
             <a:r>
               <a:rPr lang="it-IT" sz="1400" dirty="0" smtClean="0"/>
-              <a:t>I metodi generalmente utilizzati per la costruzione di queste interfacce sono basati su un sistema di regole, dette grammatiche fisse, alle quali l’utente si deve attenere per l’interazione.</a:t>
-            </a:r>
-          </a:p>
-          <a:p>
+              <a:t>dall’utente </a:t>
+            </a:r>
+            <a:r>
+              <a:rPr lang="it-IT" sz="1400" dirty="0"/>
+              <a:t>ai comandi disponibili nella casa, </a:t>
+            </a:r>
             <a:r>
               <a:rPr lang="it-IT" sz="1400" dirty="0" smtClean="0"/>
-              <a:t>Il sistema proposto propone un metodologia di associazione delle frasi pronunciate dall’utente ai comandi disponibili nella casa senza l’utilizzo di nessuna regola predefinita; essa è basata sul confronto di vettori, che rappresentano le parole.</a:t>
-            </a:r>
-          </a:p>
-          <a:p>
+              <a:t>cioè̀ </a:t>
+            </a:r>
+            <a:r>
+              <a:rPr lang="it-IT" sz="1400" dirty="0"/>
+              <a:t>attraverso l’astrazione delle parole in vettori e alla comparazione di essi, senza l’ausilio di un sistema di regole.</a:t>
+            </a:r>
+            <a:br>
+              <a:rPr lang="it-IT" sz="1400" dirty="0"/>
+            </a:br>
+            <a:r>
+              <a:rPr lang="it-IT" sz="1400" dirty="0"/>
+              <a:t>Il sistema è sempre in ascolto e viene attivato alla pronuncia del suo nome proprio, inoltre è predisposto per l’apprendimento di nuovi comandi, insegnati vocalmente dall’utente. L’assenza di grammatiche e la </a:t>
+            </a:r>
             <a:r>
               <a:rPr lang="it-IT" sz="1400" dirty="0" smtClean="0"/>
-              <a:t>L’assenza di regole e la possibilità di insegnare comandi al sistema ne garantiscono una maggior flessibilità, rendendo la conversazione con l’Agente più simile ad una conversazione reale.</a:t>
-            </a:r>
-          </a:p>
-          <a:p>
+              <a:t>possibilità </a:t>
+            </a:r>
+            <a:r>
+              <a:rPr lang="it-IT" sz="1400" dirty="0"/>
+              <a:t>di insegnamento garantiscono una maggior </a:t>
+            </a:r>
             <a:r>
               <a:rPr lang="it-IT" sz="1400" dirty="0" smtClean="0"/>
-              <a:t>Il sistema è inoltre predisposto per l’apprendimento di nuovi comandi, insegnati vocalmente dall’utente.</a:t>
-            </a:r>
-          </a:p>
-          <a:p>
+              <a:t>flessibilità, </a:t>
+            </a:r>
+            <a:r>
+              <a:rPr lang="it-IT" sz="1400" dirty="0"/>
+              <a:t>rendendo la conversazione con l’Agente </a:t>
+            </a:r>
             <a:r>
               <a:rPr lang="it-IT" sz="1400" dirty="0" smtClean="0"/>
-              <a:t>La lingua scelta per la realizzazione è l’inglese, ma è possibile aggiungere ulteriori lingue.</a:t>
+              <a:t>più </a:t>
+            </a:r>
+            <a:r>
+              <a:rPr lang="it-IT" sz="1400" dirty="0"/>
+              <a:t>simile ad una conversazione reale. </a:t>
             </a:r>
             <a:endParaRPr lang="it-IT" sz="1400" dirty="0"/>
           </a:p>
@@ -3817,7 +3886,7 @@
       </p:sp>
       <p:pic>
         <p:nvPicPr>
-          <p:cNvPr id="3" name="Picture 2"/>
+          <p:cNvPr id="5" name="Picture 4"/>
           <p:cNvPicPr>
             <a:picLocks noChangeAspect="1"/>
           </p:cNvPicPr>
@@ -3837,8 +3906,8 @@
         </p:blipFill>
         <p:spPr>
           <a:xfrm>
-            <a:off x="7324725" y="9128098"/>
-            <a:ext cx="5719642" cy="3866800"/>
+            <a:off x="3969364" y="9815807"/>
+            <a:ext cx="9337264" cy="4986068"/>
           </a:xfrm>
           <a:prstGeom prst="rect">
             <a:avLst/>
@@ -3847,7 +3916,7 @@
       </p:pic>
       <p:pic>
         <p:nvPicPr>
-          <p:cNvPr id="4" name="Picture 3"/>
+          <p:cNvPr id="7" name="Picture 6"/>
           <p:cNvPicPr>
             <a:picLocks noChangeAspect="1"/>
           </p:cNvPicPr>
@@ -3867,8 +3936,8 @@
         </p:blipFill>
         <p:spPr>
           <a:xfrm>
-            <a:off x="1038742" y="8961262"/>
-            <a:ext cx="5948974" cy="4470601"/>
+            <a:off x="1560218" y="8214888"/>
+            <a:ext cx="5334589" cy="2117751"/>
           </a:xfrm>
           <a:prstGeom prst="rect">
             <a:avLst/>

</xml_diff>